<commit_message>
Updating slide deck 9/15/2018
</commit_message>
<xml_diff>
--- a/Capstone Slide Deck.pptx
+++ b/Capstone Slide Deck.pptx
@@ -374,7 +374,7 @@
           <a:p>
             <a:fld id="{0161BB16-6213-4CD5-AC10-18DBD04D24C1}" type="datetimeFigureOut">
               <a:rPr lang="en-US" smtClean="0"/>
-              <a:t>9/6/2018</a:t>
+              <a:t>9/15/2018</a:t>
             </a:fld>
             <a:endParaRPr lang="en-US"/>
           </a:p>
@@ -636,7 +636,7 @@
           <a:p>
             <a:fld id="{0161BB16-6213-4CD5-AC10-18DBD04D24C1}" type="datetimeFigureOut">
               <a:rPr lang="en-US" smtClean="0"/>
-              <a:t>9/6/2018</a:t>
+              <a:t>9/15/2018</a:t>
             </a:fld>
             <a:endParaRPr lang="en-US"/>
           </a:p>
@@ -871,7 +871,7 @@
           <a:p>
             <a:fld id="{0161BB16-6213-4CD5-AC10-18DBD04D24C1}" type="datetimeFigureOut">
               <a:rPr lang="en-US" smtClean="0"/>
-              <a:t>9/6/2018</a:t>
+              <a:t>9/15/2018</a:t>
             </a:fld>
             <a:endParaRPr lang="en-US"/>
           </a:p>
@@ -1111,7 +1111,7 @@
           <a:p>
             <a:fld id="{0161BB16-6213-4CD5-AC10-18DBD04D24C1}" type="datetimeFigureOut">
               <a:rPr lang="en-US" smtClean="0"/>
-              <a:t>9/6/2018</a:t>
+              <a:t>9/15/2018</a:t>
             </a:fld>
             <a:endParaRPr lang="en-US"/>
           </a:p>
@@ -1418,7 +1418,7 @@
           <a:p>
             <a:fld id="{0161BB16-6213-4CD5-AC10-18DBD04D24C1}" type="datetimeFigureOut">
               <a:rPr lang="en-US" smtClean="0"/>
-              <a:t>9/6/2018</a:t>
+              <a:t>9/15/2018</a:t>
             </a:fld>
             <a:endParaRPr lang="en-US"/>
           </a:p>
@@ -1720,7 +1720,7 @@
           <a:p>
             <a:fld id="{0161BB16-6213-4CD5-AC10-18DBD04D24C1}" type="datetimeFigureOut">
               <a:rPr lang="en-US" smtClean="0"/>
-              <a:t>9/6/2018</a:t>
+              <a:t>9/15/2018</a:t>
             </a:fld>
             <a:endParaRPr lang="en-US"/>
           </a:p>
@@ -2142,7 +2142,7 @@
           <a:p>
             <a:fld id="{0161BB16-6213-4CD5-AC10-18DBD04D24C1}" type="datetimeFigureOut">
               <a:rPr lang="en-US" smtClean="0"/>
-              <a:t>9/6/2018</a:t>
+              <a:t>9/15/2018</a:t>
             </a:fld>
             <a:endParaRPr lang="en-US"/>
           </a:p>
@@ -2304,7 +2304,7 @@
           <a:p>
             <a:fld id="{0161BB16-6213-4CD5-AC10-18DBD04D24C1}" type="datetimeFigureOut">
               <a:rPr lang="en-US" smtClean="0"/>
-              <a:t>9/6/2018</a:t>
+              <a:t>9/15/2018</a:t>
             </a:fld>
             <a:endParaRPr lang="en-US"/>
           </a:p>
@@ -2399,7 +2399,7 @@
           <a:p>
             <a:fld id="{0161BB16-6213-4CD5-AC10-18DBD04D24C1}" type="datetimeFigureOut">
               <a:rPr lang="en-US" smtClean="0"/>
-              <a:t>9/6/2018</a:t>
+              <a:t>9/15/2018</a:t>
             </a:fld>
             <a:endParaRPr lang="en-US"/>
           </a:p>
@@ -2777,7 +2777,7 @@
           <a:p>
             <a:fld id="{0161BB16-6213-4CD5-AC10-18DBD04D24C1}" type="datetimeFigureOut">
               <a:rPr lang="en-US" smtClean="0"/>
-              <a:t>9/6/2018</a:t>
+              <a:t>9/15/2018</a:t>
             </a:fld>
             <a:endParaRPr lang="en-US"/>
           </a:p>
@@ -3066,7 +3066,7 @@
           <a:p>
             <a:fld id="{0161BB16-6213-4CD5-AC10-18DBD04D24C1}" type="datetimeFigureOut">
               <a:rPr lang="en-US" smtClean="0"/>
-              <a:t>9/6/2018</a:t>
+              <a:t>9/15/2018</a:t>
             </a:fld>
             <a:endParaRPr lang="en-US"/>
           </a:p>
@@ -3277,7 +3277,7 @@
           <a:p>
             <a:fld id="{0161BB16-6213-4CD5-AC10-18DBD04D24C1}" type="datetimeFigureOut">
               <a:rPr lang="en-US" smtClean="0"/>
-              <a:t>9/6/2018</a:t>
+              <a:t>9/15/2018</a:t>
             </a:fld>
             <a:endParaRPr lang="en-US"/>
           </a:p>
@@ -4026,11 +4026,7 @@
             </a:r>
             <a:r>
               <a:rPr lang="en-US" dirty="0" smtClean="0"/>
-              <a:t>														</a:t>
-            </a:r>
-            <a:r>
-              <a:rPr lang="en-US" dirty="0" smtClean="0"/>
-              <a:t>II.</a:t>
+              <a:t>														II.</a:t>
             </a:r>
             <a:endParaRPr lang="en-US" dirty="0"/>
           </a:p>
@@ -4123,11 +4119,11 @@
             </a:r>
             <a:r>
               <a:rPr lang="en-US" dirty="0" smtClean="0"/>
-              <a:t>Hispanic drivers </a:t>
-            </a:r>
-            <a:r>
-              <a:rPr lang="en-US" dirty="0" smtClean="0"/>
-              <a:t>is 1.593173 </a:t>
+              <a:t>Hispanic drivers is </a:t>
+            </a:r>
+            <a:r>
+              <a:rPr lang="en-US" dirty="0" smtClean="0"/>
+              <a:t>1.59 </a:t>
             </a:r>
             <a:r>
               <a:rPr lang="en-US" dirty="0"/>
@@ -4361,7 +4357,6 @@
               <a:rPr lang="en-US" sz="2400" dirty="0" smtClean="0"/>
               <a:t>.</a:t>
             </a:r>
-            <a:endParaRPr lang="en-US" sz="2400" dirty="0" smtClean="0"/>
           </a:p>
           <a:p>
             <a:pPr lvl="1"/>
@@ -4375,11 +4370,7 @@
             </a:r>
             <a:r>
               <a:rPr lang="en-US" sz="2000" dirty="0" smtClean="0"/>
-              <a:t>outcomes. </a:t>
-            </a:r>
-            <a:r>
-              <a:rPr lang="en-US" sz="2000" dirty="0" smtClean="0"/>
-              <a:t>Maybe a </a:t>
+              <a:t>outcomes. Maybe a </a:t>
             </a:r>
             <a:r>
               <a:rPr lang="en-US" sz="2000" dirty="0"/>
@@ -4482,11 +4473,7 @@
             </a:r>
             <a:r>
               <a:rPr lang="en-US" dirty="0" smtClean="0"/>
-              <a:t>															 </a:t>
-            </a:r>
-            <a:r>
-              <a:rPr lang="en-US" dirty="0" smtClean="0"/>
-              <a:t>I.</a:t>
+              <a:t>															 I.</a:t>
             </a:r>
             <a:endParaRPr lang="en-US" dirty="0"/>
           </a:p>
@@ -5036,11 +5023,7 @@
           <a:p>
             <a:r>
               <a:rPr lang="en-US" dirty="0" smtClean="0"/>
-              <a:t>Machine Learning </a:t>
-            </a:r>
-            <a:r>
-              <a:rPr lang="en-US" dirty="0" smtClean="0"/>
-              <a:t>																II.</a:t>
+              <a:t>Machine Learning 																II.</a:t>
             </a:r>
             <a:endParaRPr lang="en-US" dirty="0"/>
           </a:p>
@@ -5067,7 +5050,15 @@
             </a:r>
             <a:r>
               <a:rPr lang="en-US" dirty="0"/>
-              <a:t>a Kappa of 0.2849794 and an AUC value of </a:t>
+              <a:t>a Kappa of </a:t>
+            </a:r>
+            <a:r>
+              <a:rPr lang="en-US" dirty="0" smtClean="0"/>
+              <a:t>0.285 and </a:t>
+            </a:r>
+            <a:r>
+              <a:rPr lang="en-US" dirty="0"/>
+              <a:t>an AUC value of </a:t>
             </a:r>
             <a:r>
               <a:rPr lang="en-US" dirty="0" smtClean="0"/>
@@ -5347,11 +5338,7 @@
             </a:r>
             <a:r>
               <a:rPr lang="en-US" sz="2000" dirty="0"/>
-              <a:t>none </a:t>
-            </a:r>
-            <a:r>
-              <a:rPr lang="en-US" sz="2000" dirty="0"/>
-              <a:t>of the features in the </a:t>
+              <a:t>none of the features in the </a:t>
             </a:r>
             <a:r>
               <a:rPr lang="en-US" sz="2000" dirty="0" smtClean="0"/>
@@ -5377,7 +5364,6 @@
               <a:rPr lang="en-US" sz="1800" dirty="0" smtClean="0"/>
               <a:t> of the features to arrest status.</a:t>
             </a:r>
-            <a:endParaRPr lang="en-US" sz="1800" dirty="0" smtClean="0"/>
           </a:p>
           <a:p>
             <a:r>
@@ -5421,11 +5407,7 @@
             <a:pPr lvl="2"/>
             <a:r>
               <a:rPr lang="en-US" sz="1600" dirty="0" smtClean="0"/>
-              <a:t>These </a:t>
-            </a:r>
-            <a:r>
-              <a:rPr lang="en-US" sz="1600" dirty="0" smtClean="0"/>
-              <a:t>discrepancies </a:t>
+              <a:t>These discrepancies </a:t>
             </a:r>
             <a:r>
               <a:rPr lang="en-US" sz="1600" dirty="0"/>
@@ -5443,7 +5425,6 @@
               <a:rPr lang="en-US" sz="1600" dirty="0" smtClean="0"/>
               <a:t>well: correlation does not equal causation.</a:t>
             </a:r>
-            <a:endParaRPr lang="en-US" sz="1600" dirty="0" smtClean="0"/>
           </a:p>
           <a:p>
             <a:pPr lvl="2"/>
@@ -5842,11 +5823,7 @@
             <a:pPr lvl="1"/>
             <a:r>
               <a:rPr lang="en-US" sz="2000" dirty="0" smtClean="0"/>
-              <a:t>To get a holistic report and provide comparisons, standard data that is collected the same way is necessary</a:t>
-            </a:r>
-            <a:r>
-              <a:rPr lang="en-US" sz="2000" dirty="0" smtClean="0"/>
-              <a:t>.</a:t>
+              <a:t>To get a holistic report and provide comparisons, standard data that is collected the same way is necessary.</a:t>
             </a:r>
           </a:p>
           <a:p>
@@ -6431,11 +6408,7 @@
           <a:p>
             <a:r>
               <a:rPr lang="en-US" dirty="0" smtClean="0"/>
-              <a:t>Data 																				    </a:t>
-            </a:r>
-            <a:r>
-              <a:rPr lang="en-US" dirty="0" smtClean="0"/>
-              <a:t> II.</a:t>
+              <a:t>Data 																				     II.</a:t>
             </a:r>
             <a:endParaRPr lang="en-US" dirty="0"/>
           </a:p>
@@ -6551,11 +6524,7 @@
             </a:r>
             <a:r>
               <a:rPr lang="en-US" dirty="0" smtClean="0"/>
-              <a:t>																			    </a:t>
-            </a:r>
-            <a:r>
-              <a:rPr lang="en-US" dirty="0" smtClean="0"/>
-              <a:t>III.</a:t>
+              <a:t>																			    III.</a:t>
             </a:r>
             <a:endParaRPr lang="en-US" dirty="0"/>
           </a:p>
@@ -7592,11 +7561,7 @@
             </a:r>
             <a:r>
               <a:rPr lang="en-US" dirty="0" smtClean="0"/>
-              <a:t>Race </a:t>
-            </a:r>
-            <a:r>
-              <a:rPr lang="en-US" dirty="0" smtClean="0"/>
-              <a:t>															 I.</a:t>
+              <a:t>Race 															 I.</a:t>
             </a:r>
             <a:endParaRPr lang="en-US" dirty="0"/>
           </a:p>

</xml_diff>